<commit_message>
day 12 views change
</commit_message>
<xml_diff>
--- a/docs/lecture_slides/WDAE-Slides-12.pptx
+++ b/docs/lecture_slides/WDAE-Slides-12.pptx
@@ -1,6 +1,6 @@
 
 <file path=ppt/presentation.xml><?xml version="1.0" encoding="utf-8"?>
-<p:presentation xmlns:a="http://schemas.openxmlformats.org/drawingml/2006/main" xmlns:r="http://schemas.openxmlformats.org/officeDocument/2006/relationships" xmlns:p="http://schemas.openxmlformats.org/presentationml/2006/main" compatMode="1" strictFirstAndLastChars="0" saveSubsetFonts="1" autoCompressPictures="0">
+<p:presentation xmlns:a="http://schemas.openxmlformats.org/drawingml/2006/main" xmlns:r="http://schemas.openxmlformats.org/officeDocument/2006/relationships" xmlns:p="http://schemas.openxmlformats.org/presentationml/2006/main" strictFirstAndLastChars="0" saveSubsetFonts="1" autoCompressPictures="0">
   <p:sldMasterIdLst>
     <p:sldMasterId id="2147483673" r:id="rId1"/>
   </p:sldMasterIdLst>
@@ -5733,8 +5733,24 @@
               <a:t> </a:t>
             </a:r>
             <a:r>
+              <a:rPr lang="en-US" altLang="ja-JP" dirty="0" smtClean="0"/>
+              <a:t>1</a:t>
+            </a:r>
+            <a:r>
+              <a:rPr lang="en-US" altLang="ja-JP" dirty="0" smtClean="0"/>
+              <a:t>4</a:t>
+            </a:r>
+            <a:r>
+              <a:rPr lang="en-US" altLang="ja-JP" dirty="0" smtClean="0"/>
+              <a:t>,</a:t>
+            </a:r>
+            <a:r>
+              <a:rPr lang="ja-JP" altLang="en-US" dirty="0" smtClean="0"/>
+              <a:t> </a:t>
+            </a:r>
+            <a:r>
               <a:rPr lang="en-US" altLang="ja-JP" dirty="0"/>
-              <a:t>13,</a:t>
+              <a:t>and</a:t>
             </a:r>
             <a:r>
               <a:rPr lang="ja-JP" altLang="en-US" dirty="0"/>
@@ -5742,26 +5758,26 @@
             </a:r>
             <a:r>
               <a:rPr lang="en-US" altLang="ja-JP" dirty="0"/>
-              <a:t>and</a:t>
+              <a:t>Day</a:t>
             </a:r>
             <a:r>
               <a:rPr lang="ja-JP" altLang="en-US" dirty="0"/>
               <a:t> </a:t>
             </a:r>
             <a:r>
-              <a:rPr lang="en-US" altLang="ja-JP" dirty="0"/>
-              <a:t>Day</a:t>
-            </a:r>
-            <a:r>
-              <a:rPr lang="ja-JP" altLang="en-US" dirty="0"/>
-              <a:t> </a:t>
-            </a:r>
-            <a:r>
-              <a:rPr lang="en-US" altLang="ja-JP" dirty="0"/>
-              <a:t>14:</a:t>
-            </a:r>
-            <a:r>
-              <a:rPr lang="ja-JP" altLang="en-US" dirty="0"/>
+              <a:rPr lang="en-US" altLang="ja-JP" dirty="0" smtClean="0"/>
+              <a:t>1</a:t>
+            </a:r>
+            <a:r>
+              <a:rPr lang="en-US" altLang="ja-JP" dirty="0" smtClean="0"/>
+              <a:t>5</a:t>
+            </a:r>
+            <a:r>
+              <a:rPr lang="en-US" altLang="ja-JP" dirty="0" smtClean="0"/>
+              <a:t>:</a:t>
+            </a:r>
+            <a:r>
+              <a:rPr lang="ja-JP" altLang="en-US" dirty="0" smtClean="0"/>
               <a:t> </a:t>
             </a:r>
             <a:r>
@@ -5769,19 +5785,19 @@
               <a:t>spend</a:t>
             </a:r>
             <a:r>
-              <a:rPr lang="ja-JP" altLang="en-US" dirty="0"/>
+              <a:rPr lang="ja-JP" altLang="en-US"/>
               <a:t> </a:t>
             </a:r>
             <a:r>
-              <a:rPr lang="ja-JP" altLang="ja-JP" dirty="0"/>
-              <a:t>2</a:t>
-            </a:r>
-            <a:r>
-              <a:rPr lang="en-US" altLang="ja-JP" dirty="0"/>
-              <a:t>0min</a:t>
-            </a:r>
-            <a:r>
-              <a:rPr lang="ja-JP" altLang="en-US" dirty="0"/>
+              <a:rPr lang="en-US" altLang="ja-JP" smtClean="0"/>
+              <a:t>20</a:t>
+            </a:r>
+            <a:r>
+              <a:rPr lang="en-US" altLang="ja-JP" smtClean="0"/>
+              <a:t>min</a:t>
+            </a:r>
+            <a:r>
+              <a:rPr lang="ja-JP" altLang="en-US" dirty="0" smtClean="0"/>
               <a:t> </a:t>
             </a:r>
             <a:r>

</xml_diff>